<commit_message>
Lecture 12 - fixed typo
</commit_message>
<xml_diff>
--- a/f24/assets/slides/lec12-mac-protocols.pptx
+++ b/f24/assets/slides/lec12-mac-protocols.pptx
@@ -156,14 +156,6 @@
     </p:ext>
   </p:extLst>
 </p:presentation>
-</file>
-
-<file path=ppt/revisionInfo.xml><?xml version="1.0" encoding="utf-8"?>
-<p1510:revInfo xmlns:a="http://schemas.openxmlformats.org/drawingml/2006/main" xmlns:r="http://schemas.openxmlformats.org/officeDocument/2006/relationships" xmlns:p1510="http://schemas.microsoft.com/office/powerpoint/2015/10/main">
-  <p1510:revLst>
-    <p1510:client id="{BD7C4BEB-CB79-CAF3-2E3C-BD30B1C23346}" v="5666" dt="2024-10-03T16:22:30.906"/>
-  </p1510:revLst>
-</p1510:revInfo>
 </file>
 
 <file path=ppt/notesMasters/notesMaster1.xml><?xml version="1.0" encoding="utf-8"?>
@@ -4073,6 +4065,12 @@
               <a:prstGeom prst="rect">
                 <a:avLst/>
               </a:prstGeom>
+              <a:solidFill>
+                <a:schemeClr val="tx2">
+                  <a:lumMod val="25000"/>
+                  <a:lumOff val="75000"/>
+                </a:schemeClr>
+              </a:solidFill>
             </p:spPr>
             <p:style>
               <a:lnRef idx="2">
@@ -4120,10 +4118,7 @@
                 <a:avLst/>
               </a:prstGeom>
               <a:solidFill>
-                <a:schemeClr val="tx2">
-                  <a:lumMod val="25000"/>
-                  <a:lumOff val="75000"/>
-                </a:schemeClr>
+                <a:schemeClr val="accent1"/>
               </a:solidFill>
             </p:spPr>
             <p:style>
@@ -4948,6 +4943,12 @@
             <a:prstGeom prst="rect">
               <a:avLst/>
             </a:prstGeom>
+            <a:solidFill>
+              <a:schemeClr val="tx2">
+                <a:lumMod val="25000"/>
+                <a:lumOff val="75000"/>
+              </a:schemeClr>
+            </a:solidFill>
           </p:spPr>
           <p:style>
             <a:lnRef idx="2">
@@ -4995,10 +4996,7 @@
               <a:avLst/>
             </a:prstGeom>
             <a:solidFill>
-              <a:schemeClr val="tx2">
-                <a:lumMod val="25000"/>
-                <a:lumOff val="75000"/>
-              </a:schemeClr>
+              <a:schemeClr val="accent1"/>
             </a:solidFill>
           </p:spPr>
           <p:style>
@@ -6384,6 +6382,12 @@
             <a:prstGeom prst="rect">
               <a:avLst/>
             </a:prstGeom>
+            <a:solidFill>
+              <a:schemeClr val="tx2">
+                <a:lumMod val="25000"/>
+                <a:lumOff val="75000"/>
+              </a:schemeClr>
+            </a:solidFill>
           </p:spPr>
           <p:style>
             <a:lnRef idx="2">
@@ -6431,10 +6435,7 @@
               <a:avLst/>
             </a:prstGeom>
             <a:solidFill>
-              <a:schemeClr val="tx2">
-                <a:lumMod val="25000"/>
-                <a:lumOff val="75000"/>
-              </a:schemeClr>
+              <a:srgbClr val="156082"/>
             </a:solidFill>
           </p:spPr>
           <p:style>
@@ -7820,6 +7821,12 @@
             <a:prstGeom prst="rect">
               <a:avLst/>
             </a:prstGeom>
+            <a:solidFill>
+              <a:schemeClr val="tx2">
+                <a:lumMod val="25000"/>
+                <a:lumOff val="75000"/>
+              </a:schemeClr>
+            </a:solidFill>
           </p:spPr>
           <p:style>
             <a:lnRef idx="2">
@@ -7867,10 +7874,7 @@
               <a:avLst/>
             </a:prstGeom>
             <a:solidFill>
-              <a:schemeClr val="tx2">
-                <a:lumMod val="25000"/>
-                <a:lumOff val="75000"/>
-              </a:schemeClr>
+              <a:srgbClr val="156082"/>
             </a:solidFill>
           </p:spPr>
           <p:style>
@@ -9241,6 +9245,12 @@
             <a:prstGeom prst="rect">
               <a:avLst/>
             </a:prstGeom>
+            <a:solidFill>
+              <a:schemeClr val="tx2">
+                <a:lumMod val="25000"/>
+                <a:lumOff val="75000"/>
+              </a:schemeClr>
+            </a:solidFill>
           </p:spPr>
           <p:style>
             <a:lnRef idx="2">
@@ -9288,10 +9298,7 @@
               <a:avLst/>
             </a:prstGeom>
             <a:solidFill>
-              <a:schemeClr val="tx2">
-                <a:lumMod val="25000"/>
-                <a:lumOff val="75000"/>
-              </a:schemeClr>
+              <a:srgbClr val="156082"/>
             </a:solidFill>
           </p:spPr>
           <p:style>
@@ -14058,6 +14065,12 @@
             <a:prstGeom prst="rect">
               <a:avLst/>
             </a:prstGeom>
+            <a:solidFill>
+              <a:schemeClr val="tx2">
+                <a:lumMod val="25000"/>
+                <a:lumOff val="75000"/>
+              </a:schemeClr>
+            </a:solidFill>
           </p:spPr>
           <p:style>
             <a:lnRef idx="2">
@@ -14105,10 +14118,7 @@
               <a:avLst/>
             </a:prstGeom>
             <a:solidFill>
-              <a:schemeClr val="tx2">
-                <a:lumMod val="25000"/>
-                <a:lumOff val="75000"/>
-              </a:schemeClr>
+              <a:srgbClr val="156082"/>
             </a:solidFill>
           </p:spPr>
           <p:style>
@@ -14576,6 +14586,12 @@
             <a:prstGeom prst="rect">
               <a:avLst/>
             </a:prstGeom>
+            <a:solidFill>
+              <a:schemeClr val="accent1">
+                <a:lumMod val="40000"/>
+                <a:lumOff val="60000"/>
+              </a:schemeClr>
+            </a:solidFill>
           </p:spPr>
           <p:style>
             <a:lnRef idx="2">
@@ -14623,10 +14639,7 @@
               <a:avLst/>
             </a:prstGeom>
             <a:solidFill>
-              <a:schemeClr val="tx2">
-                <a:lumMod val="25000"/>
-                <a:lumOff val="75000"/>
-              </a:schemeClr>
+              <a:srgbClr val="156082"/>
             </a:solidFill>
           </p:spPr>
           <p:style>

</xml_diff>